<commit_message>
Update figures for extra NOMINATE analysis
</commit_message>
<xml_diff>
--- a/R/figures/final_figs/figs.pptx
+++ b/R/figures/final_figs/figs.pptx
@@ -12,7 +12,8 @@
     <p:sldId id="266" r:id="rId6"/>
     <p:sldId id="265" r:id="rId7"/>
     <p:sldId id="259" r:id="rId8"/>
-    <p:sldId id="262" r:id="rId9"/>
+    <p:sldId id="267" r:id="rId9"/>
+    <p:sldId id="262" r:id="rId10"/>
   </p:sldIdLst>
   <p:sldSz cx="7772400" cy="10058400"/>
   <p:notesSz cx="6858000" cy="9144000"/>
@@ -250,7 +251,7 @@
           <a:p>
             <a:fld id="{84FDAD1B-D8A9-CB4E-B013-34AAA91A7A87}" type="datetimeFigureOut">
               <a:rPr lang="en-US" smtClean="0"/>
-              <a:t>12/30/20</a:t>
+              <a:t>4/17/21</a:t>
             </a:fld>
             <a:endParaRPr lang="en-US"/>
           </a:p>
@@ -415,7 +416,7 @@
           <a:p>
             <a:fld id="{84FDAD1B-D8A9-CB4E-B013-34AAA91A7A87}" type="datetimeFigureOut">
               <a:rPr lang="en-US" smtClean="0"/>
-              <a:t>12/30/20</a:t>
+              <a:t>4/17/21</a:t>
             </a:fld>
             <a:endParaRPr lang="en-US"/>
           </a:p>
@@ -590,7 +591,7 @@
           <a:p>
             <a:fld id="{84FDAD1B-D8A9-CB4E-B013-34AAA91A7A87}" type="datetimeFigureOut">
               <a:rPr lang="en-US" smtClean="0"/>
-              <a:t>12/30/20</a:t>
+              <a:t>4/17/21</a:t>
             </a:fld>
             <a:endParaRPr lang="en-US"/>
           </a:p>
@@ -755,7 +756,7 @@
           <a:p>
             <a:fld id="{84FDAD1B-D8A9-CB4E-B013-34AAA91A7A87}" type="datetimeFigureOut">
               <a:rPr lang="en-US" smtClean="0"/>
-              <a:t>12/30/20</a:t>
+              <a:t>4/17/21</a:t>
             </a:fld>
             <a:endParaRPr lang="en-US"/>
           </a:p>
@@ -994,7 +995,7 @@
           <a:p>
             <a:fld id="{84FDAD1B-D8A9-CB4E-B013-34AAA91A7A87}" type="datetimeFigureOut">
               <a:rPr lang="en-US" smtClean="0"/>
-              <a:t>12/30/20</a:t>
+              <a:t>4/17/21</a:t>
             </a:fld>
             <a:endParaRPr lang="en-US"/>
           </a:p>
@@ -1221,7 +1222,7 @@
           <a:p>
             <a:fld id="{84FDAD1B-D8A9-CB4E-B013-34AAA91A7A87}" type="datetimeFigureOut">
               <a:rPr lang="en-US" smtClean="0"/>
-              <a:t>12/30/20</a:t>
+              <a:t>4/17/21</a:t>
             </a:fld>
             <a:endParaRPr lang="en-US"/>
           </a:p>
@@ -1583,7 +1584,7 @@
           <a:p>
             <a:fld id="{84FDAD1B-D8A9-CB4E-B013-34AAA91A7A87}" type="datetimeFigureOut">
               <a:rPr lang="en-US" smtClean="0"/>
-              <a:t>12/30/20</a:t>
+              <a:t>4/17/21</a:t>
             </a:fld>
             <a:endParaRPr lang="en-US"/>
           </a:p>
@@ -1696,7 +1697,7 @@
           <a:p>
             <a:fld id="{84FDAD1B-D8A9-CB4E-B013-34AAA91A7A87}" type="datetimeFigureOut">
               <a:rPr lang="en-US" smtClean="0"/>
-              <a:t>12/30/20</a:t>
+              <a:t>4/17/21</a:t>
             </a:fld>
             <a:endParaRPr lang="en-US"/>
           </a:p>
@@ -1786,7 +1787,7 @@
           <a:p>
             <a:fld id="{84FDAD1B-D8A9-CB4E-B013-34AAA91A7A87}" type="datetimeFigureOut">
               <a:rPr lang="en-US" smtClean="0"/>
-              <a:t>12/30/20</a:t>
+              <a:t>4/17/21</a:t>
             </a:fld>
             <a:endParaRPr lang="en-US"/>
           </a:p>
@@ -2058,7 +2059,7 @@
           <a:p>
             <a:fld id="{84FDAD1B-D8A9-CB4E-B013-34AAA91A7A87}" type="datetimeFigureOut">
               <a:rPr lang="en-US" smtClean="0"/>
-              <a:t>12/30/20</a:t>
+              <a:t>4/17/21</a:t>
             </a:fld>
             <a:endParaRPr lang="en-US"/>
           </a:p>
@@ -2310,7 +2311,7 @@
           <a:p>
             <a:fld id="{84FDAD1B-D8A9-CB4E-B013-34AAA91A7A87}" type="datetimeFigureOut">
               <a:rPr lang="en-US" smtClean="0"/>
-              <a:t>12/30/20</a:t>
+              <a:t>4/17/21</a:t>
             </a:fld>
             <a:endParaRPr lang="en-US"/>
           </a:p>
@@ -2518,7 +2519,7 @@
           <a:p>
             <a:fld id="{84FDAD1B-D8A9-CB4E-B013-34AAA91A7A87}" type="datetimeFigureOut">
               <a:rPr lang="en-US" smtClean="0"/>
-              <a:t>12/30/20</a:t>
+              <a:t>4/17/21</a:t>
             </a:fld>
             <a:endParaRPr lang="en-US"/>
           </a:p>
@@ -13507,60 +13508,6 @@
           <a:chExt cx="0" cy="0"/>
         </a:xfrm>
       </p:grpSpPr>
-      <p:sp>
-        <p:nvSpPr>
-          <p:cNvPr id="8" name="TextBox 7"/>
-          <p:cNvSpPr txBox="1"/>
-          <p:nvPr/>
-        </p:nvSpPr>
-        <p:spPr>
-          <a:xfrm>
-            <a:off x="1826008" y="500625"/>
-            <a:ext cx="3894015" cy="307777"/>
-          </a:xfrm>
-          <a:prstGeom prst="rect">
-            <a:avLst/>
-          </a:prstGeom>
-          <a:noFill/>
-        </p:spPr>
-        <p:txBody>
-          <a:bodyPr wrap="none" rtlCol="0">
-            <a:spAutoFit/>
-          </a:bodyPr>
-          <a:lstStyle/>
-          <a:p>
-            <a:r>
-              <a:rPr lang="en-US" sz="1400" dirty="0" smtClean="0">
-                <a:latin typeface="Helvetica Neue" charset="0"/>
-                <a:ea typeface="Helvetica Neue" charset="0"/>
-                <a:cs typeface="Helvetica Neue" charset="0"/>
-              </a:rPr>
-              <a:t>Correlation of L1 and </a:t>
-            </a:r>
-            <a:r>
-              <a:rPr lang="en-US" sz="1400" dirty="0" err="1" smtClean="0">
-                <a:latin typeface="Helvetica Neue" charset="0"/>
-                <a:ea typeface="Helvetica Neue" charset="0"/>
-                <a:cs typeface="Helvetica Neue" charset="0"/>
-              </a:rPr>
-              <a:t>NNet</a:t>
-            </a:r>
-            <a:r>
-              <a:rPr lang="en-US" sz="1400" dirty="0" smtClean="0">
-                <a:latin typeface="Helvetica Neue" charset="0"/>
-                <a:ea typeface="Helvetica Neue" charset="0"/>
-                <a:cs typeface="Helvetica Neue" charset="0"/>
-              </a:rPr>
-              <a:t> Pairwise Distances</a:t>
-            </a:r>
-            <a:endParaRPr lang="en-US" sz="1400" dirty="0">
-              <a:latin typeface="Helvetica Neue" charset="0"/>
-              <a:ea typeface="Helvetica Neue" charset="0"/>
-              <a:cs typeface="Helvetica Neue" charset="0"/>
-            </a:endParaRPr>
-          </a:p>
-        </p:txBody>
-      </p:sp>
       <p:pic>
         <p:nvPicPr>
           <p:cNvPr id="4" name="Picture 3"/>
@@ -13569,7 +13516,7 @@
           </p:cNvPicPr>
           <p:nvPr/>
         </p:nvPicPr>
-        <p:blipFill>
+        <p:blipFill rotWithShape="1">
           <a:blip r:embed="rId2">
             <a:extLst>
               <a:ext uri="{28A0092B-C50C-407E-A947-70E740481C1C}">
@@ -13577,20 +13524,205 @@
               </a:ext>
             </a:extLst>
           </a:blip>
-          <a:stretch>
-            <a:fillRect/>
-          </a:stretch>
+          <a:srcRect l="3731" t="6452" b="6222"/>
+          <a:stretch/>
         </p:blipFill>
         <p:spPr>
           <a:xfrm>
-            <a:off x="304258" y="361479"/>
-            <a:ext cx="6927574" cy="6927574"/>
+            <a:off x="562708" y="808402"/>
+            <a:ext cx="6669124" cy="6049598"/>
           </a:xfrm>
           <a:prstGeom prst="rect">
             <a:avLst/>
           </a:prstGeom>
         </p:spPr>
       </p:pic>
+      <p:sp>
+        <p:nvSpPr>
+          <p:cNvPr id="2" name="TextBox 1"/>
+          <p:cNvSpPr txBox="1"/>
+          <p:nvPr/>
+        </p:nvSpPr>
+        <p:spPr>
+          <a:xfrm>
+            <a:off x="1961035" y="500625"/>
+            <a:ext cx="3845925" cy="307777"/>
+          </a:xfrm>
+          <a:prstGeom prst="rect">
+            <a:avLst/>
+          </a:prstGeom>
+          <a:noFill/>
+        </p:spPr>
+        <p:txBody>
+          <a:bodyPr wrap="none" rtlCol="0">
+            <a:spAutoFit/>
+          </a:bodyPr>
+          <a:lstStyle/>
+          <a:p>
+            <a:r>
+              <a:rPr lang="en-US" sz="1400" dirty="0" smtClean="0">
+                <a:latin typeface="Helvetica Neue" charset="0"/>
+                <a:ea typeface="Helvetica Neue" charset="0"/>
+                <a:cs typeface="Helvetica Neue" charset="0"/>
+              </a:rPr>
+              <a:t>Correlation of L</a:t>
+            </a:r>
+            <a:r>
+              <a:rPr lang="en-US" sz="1400" baseline="-25000" dirty="0" smtClean="0">
+                <a:latin typeface="Helvetica Neue" charset="0"/>
+                <a:ea typeface="Helvetica Neue" charset="0"/>
+                <a:cs typeface="Helvetica Neue" charset="0"/>
+              </a:rPr>
+              <a:t>1 </a:t>
+            </a:r>
+            <a:r>
+              <a:rPr lang="en-US" sz="1400" dirty="0" smtClean="0">
+                <a:latin typeface="Helvetica Neue" charset="0"/>
+                <a:ea typeface="Helvetica Neue" charset="0"/>
+                <a:cs typeface="Helvetica Neue" charset="0"/>
+              </a:rPr>
+              <a:t>and </a:t>
+            </a:r>
+            <a:r>
+              <a:rPr lang="en-US" sz="1400" dirty="0" err="1" smtClean="0">
+                <a:latin typeface="Helvetica Neue" charset="0"/>
+                <a:ea typeface="Helvetica Neue" charset="0"/>
+                <a:cs typeface="Helvetica Neue" charset="0"/>
+              </a:rPr>
+              <a:t>NNet</a:t>
+            </a:r>
+            <a:r>
+              <a:rPr lang="en-US" sz="1400" dirty="0" smtClean="0">
+                <a:latin typeface="Helvetica Neue" charset="0"/>
+                <a:ea typeface="Helvetica Neue" charset="0"/>
+                <a:cs typeface="Helvetica Neue" charset="0"/>
+              </a:rPr>
+              <a:t> Pairwise Distances</a:t>
+            </a:r>
+            <a:endParaRPr lang="en-US" sz="1400" dirty="0">
+              <a:latin typeface="Helvetica Neue" charset="0"/>
+              <a:ea typeface="Helvetica Neue" charset="0"/>
+              <a:cs typeface="Helvetica Neue" charset="0"/>
+            </a:endParaRPr>
+          </a:p>
+        </p:txBody>
+      </p:sp>
+      <p:sp>
+        <p:nvSpPr>
+          <p:cNvPr id="5" name="TextBox 4"/>
+          <p:cNvSpPr txBox="1"/>
+          <p:nvPr/>
+        </p:nvSpPr>
+        <p:spPr>
+          <a:xfrm rot="16200000">
+            <a:off x="-186857" y="3740858"/>
+            <a:ext cx="1191352" cy="307777"/>
+          </a:xfrm>
+          <a:prstGeom prst="rect">
+            <a:avLst/>
+          </a:prstGeom>
+          <a:noFill/>
+        </p:spPr>
+        <p:txBody>
+          <a:bodyPr wrap="none" rtlCol="0">
+            <a:spAutoFit/>
+          </a:bodyPr>
+          <a:lstStyle/>
+          <a:p>
+            <a:r>
+              <a:rPr lang="en-US" sz="1400" dirty="0" smtClean="0">
+                <a:latin typeface="Helvetica Neue" charset="0"/>
+                <a:ea typeface="Helvetica Neue" charset="0"/>
+                <a:cs typeface="Helvetica Neue" charset="0"/>
+              </a:rPr>
+              <a:t>L</a:t>
+            </a:r>
+            <a:r>
+              <a:rPr lang="en-US" sz="1400" baseline="-25000" dirty="0" smtClean="0">
+                <a:latin typeface="Helvetica Neue" charset="0"/>
+                <a:ea typeface="Helvetica Neue" charset="0"/>
+                <a:cs typeface="Helvetica Neue" charset="0"/>
+              </a:rPr>
+              <a:t>1</a:t>
+            </a:r>
+            <a:r>
+              <a:rPr lang="en-US" sz="1400" dirty="0" smtClean="0">
+                <a:latin typeface="Helvetica Neue" charset="0"/>
+                <a:ea typeface="Helvetica Neue" charset="0"/>
+                <a:cs typeface="Helvetica Neue" charset="0"/>
+              </a:rPr>
+              <a:t> Distances</a:t>
+            </a:r>
+            <a:endParaRPr lang="en-US" sz="1400" dirty="0">
+              <a:latin typeface="Helvetica Neue" charset="0"/>
+              <a:ea typeface="Helvetica Neue" charset="0"/>
+              <a:cs typeface="Helvetica Neue" charset="0"/>
+            </a:endParaRPr>
+          </a:p>
+        </p:txBody>
+      </p:sp>
+      <p:sp>
+        <p:nvSpPr>
+          <p:cNvPr id="6" name="TextBox 5"/>
+          <p:cNvSpPr txBox="1"/>
+          <p:nvPr/>
+        </p:nvSpPr>
+        <p:spPr>
+          <a:xfrm>
+            <a:off x="2585404" y="6981092"/>
+            <a:ext cx="2657843" cy="307777"/>
+          </a:xfrm>
+          <a:prstGeom prst="rect">
+            <a:avLst/>
+          </a:prstGeom>
+          <a:noFill/>
+        </p:spPr>
+        <p:txBody>
+          <a:bodyPr wrap="none" rtlCol="0">
+            <a:spAutoFit/>
+          </a:bodyPr>
+          <a:lstStyle/>
+          <a:p>
+            <a:r>
+              <a:rPr lang="en-US" sz="1400" dirty="0" smtClean="0">
+                <a:latin typeface="Helvetica Neue" charset="0"/>
+                <a:ea typeface="Helvetica Neue" charset="0"/>
+                <a:cs typeface="Helvetica Neue" charset="0"/>
+              </a:rPr>
+              <a:t>Neighbor-Net </a:t>
+            </a:r>
+            <a:r>
+              <a:rPr lang="en-US" sz="1400" dirty="0" smtClean="0">
+                <a:latin typeface="Helvetica Neue" charset="0"/>
+                <a:ea typeface="Helvetica Neue" charset="0"/>
+                <a:cs typeface="Helvetica Neue" charset="0"/>
+              </a:rPr>
+              <a:t>(</a:t>
+            </a:r>
+            <a:r>
+              <a:rPr lang="en-US" sz="1400" dirty="0" err="1" smtClean="0">
+                <a:latin typeface="Helvetica Neue" charset="0"/>
+                <a:ea typeface="Helvetica Neue" charset="0"/>
+                <a:cs typeface="Helvetica Neue" charset="0"/>
+              </a:rPr>
+              <a:t>NNet</a:t>
+            </a:r>
+            <a:r>
+              <a:rPr lang="en-US" sz="1400" dirty="0" smtClean="0">
+                <a:latin typeface="Helvetica Neue" charset="0"/>
+                <a:ea typeface="Helvetica Neue" charset="0"/>
+                <a:cs typeface="Helvetica Neue" charset="0"/>
+              </a:rPr>
+              <a:t>) Distances</a:t>
+            </a:r>
+            <a:endParaRPr lang="en-US" sz="1400" dirty="0">
+              <a:latin typeface="Helvetica Neue" charset="0"/>
+              <a:ea typeface="Helvetica Neue" charset="0"/>
+              <a:cs typeface="Helvetica Neue" charset="0"/>
+            </a:endParaRPr>
+          </a:p>
+        </p:txBody>
+      </p:sp>
     </p:spTree>
     <p:extLst>
       <p:ext uri="{BB962C8B-B14F-4D97-AF65-F5344CB8AC3E}">
@@ -15708,6 +15840,783 @@
 </file>
 
 <file path=ppt/slides/slide8.xml><?xml version="1.0" encoding="utf-8"?>
+<p:sld xmlns:a="http://schemas.openxmlformats.org/drawingml/2006/main" xmlns:r="http://schemas.openxmlformats.org/officeDocument/2006/relationships" xmlns:p="http://schemas.openxmlformats.org/presentationml/2006/main">
+  <p:cSld>
+    <p:spTree>
+      <p:nvGrpSpPr>
+        <p:cNvPr id="1" name=""/>
+        <p:cNvGrpSpPr/>
+        <p:nvPr/>
+      </p:nvGrpSpPr>
+      <p:grpSpPr>
+        <a:xfrm>
+          <a:off x="0" y="0"/>
+          <a:ext cx="0" cy="0"/>
+          <a:chOff x="0" y="0"/>
+          <a:chExt cx="0" cy="0"/>
+        </a:xfrm>
+      </p:grpSpPr>
+      <p:pic>
+        <p:nvPicPr>
+          <p:cNvPr id="4" name="Picture 3"/>
+          <p:cNvPicPr>
+            <a:picLocks noChangeAspect="1"/>
+          </p:cNvPicPr>
+          <p:nvPr/>
+        </p:nvPicPr>
+        <p:blipFill rotWithShape="1">
+          <a:blip r:embed="rId2">
+            <a:extLst>
+              <a:ext uri="{28A0092B-C50C-407E-A947-70E740481C1C}">
+                <a14:useLocalDpi xmlns:a14="http://schemas.microsoft.com/office/drawing/2010/main" val="0"/>
+              </a:ext>
+            </a:extLst>
+          </a:blip>
+          <a:srcRect l="1880" r="953"/>
+          <a:stretch/>
+        </p:blipFill>
+        <p:spPr>
+          <a:xfrm>
+            <a:off x="417600" y="245633"/>
+            <a:ext cx="7232451" cy="3101379"/>
+          </a:xfrm>
+          <a:prstGeom prst="rect">
+            <a:avLst/>
+          </a:prstGeom>
+        </p:spPr>
+      </p:pic>
+      <p:sp>
+        <p:nvSpPr>
+          <p:cNvPr id="5" name="TextBox 4"/>
+          <p:cNvSpPr txBox="1"/>
+          <p:nvPr/>
+        </p:nvSpPr>
+        <p:spPr>
+          <a:xfrm>
+            <a:off x="2904871" y="193432"/>
+            <a:ext cx="1616148" cy="230832"/>
+          </a:xfrm>
+          <a:prstGeom prst="rect">
+            <a:avLst/>
+          </a:prstGeom>
+          <a:noFill/>
+        </p:spPr>
+        <p:txBody>
+          <a:bodyPr wrap="none" rtlCol="0">
+            <a:spAutoFit/>
+          </a:bodyPr>
+          <a:lstStyle/>
+          <a:p>
+            <a:r>
+              <a:rPr lang="en-US" sz="900" dirty="0" smtClean="0">
+                <a:latin typeface="Helvetica Neue" charset="0"/>
+                <a:ea typeface="Helvetica Neue" charset="0"/>
+                <a:cs typeface="Helvetica Neue" charset="0"/>
+              </a:rPr>
+              <a:t>Party Agreement Over Time</a:t>
+            </a:r>
+            <a:endParaRPr lang="en-US" sz="900" dirty="0">
+              <a:latin typeface="Helvetica Neue" charset="0"/>
+              <a:ea typeface="Helvetica Neue" charset="0"/>
+              <a:cs typeface="Helvetica Neue" charset="0"/>
+            </a:endParaRPr>
+          </a:p>
+        </p:txBody>
+      </p:sp>
+      <p:sp>
+        <p:nvSpPr>
+          <p:cNvPr id="6" name="TextBox 5"/>
+          <p:cNvSpPr txBox="1"/>
+          <p:nvPr/>
+        </p:nvSpPr>
+        <p:spPr>
+          <a:xfrm>
+            <a:off x="16861" y="-32572"/>
+            <a:ext cx="272832" cy="276999"/>
+          </a:xfrm>
+          <a:prstGeom prst="rect">
+            <a:avLst/>
+          </a:prstGeom>
+          <a:noFill/>
+        </p:spPr>
+        <p:txBody>
+          <a:bodyPr wrap="none" rtlCol="0">
+            <a:spAutoFit/>
+          </a:bodyPr>
+          <a:lstStyle/>
+          <a:p>
+            <a:r>
+              <a:rPr lang="en-US" sz="1200" b="1" dirty="0">
+                <a:latin typeface="Helvetica Neue" charset="0"/>
+                <a:ea typeface="Helvetica Neue" charset="0"/>
+                <a:cs typeface="Helvetica Neue" charset="0"/>
+              </a:rPr>
+              <a:t>a</a:t>
+            </a:r>
+          </a:p>
+        </p:txBody>
+      </p:sp>
+      <p:sp>
+        <p:nvSpPr>
+          <p:cNvPr id="7" name="TextBox 6"/>
+          <p:cNvSpPr txBox="1"/>
+          <p:nvPr/>
+        </p:nvSpPr>
+        <p:spPr>
+          <a:xfrm rot="16200000">
+            <a:off x="-224605" y="1449226"/>
+            <a:ext cx="1040670" cy="200055"/>
+          </a:xfrm>
+          <a:prstGeom prst="rect">
+            <a:avLst/>
+          </a:prstGeom>
+          <a:noFill/>
+        </p:spPr>
+        <p:txBody>
+          <a:bodyPr wrap="none" rtlCol="0">
+            <a:spAutoFit/>
+          </a:bodyPr>
+          <a:lstStyle/>
+          <a:p>
+            <a:r>
+              <a:rPr lang="en-US" sz="700" dirty="0">
+                <a:latin typeface="Helvetica Neue" charset="0"/>
+                <a:ea typeface="Helvetica Neue" charset="0"/>
+                <a:cs typeface="Helvetica Neue" charset="0"/>
+              </a:rPr>
+              <a:t>Distance from Center</a:t>
+            </a:r>
+          </a:p>
+        </p:txBody>
+      </p:sp>
+      <p:pic>
+        <p:nvPicPr>
+          <p:cNvPr id="8" name="Picture 7"/>
+          <p:cNvPicPr>
+            <a:picLocks noChangeAspect="1"/>
+          </p:cNvPicPr>
+          <p:nvPr/>
+        </p:nvPicPr>
+        <p:blipFill>
+          <a:blip r:embed="rId3">
+            <a:extLst>
+              <a:ext uri="{28A0092B-C50C-407E-A947-70E740481C1C}">
+                <a14:useLocalDpi xmlns:a14="http://schemas.microsoft.com/office/drawing/2010/main" val="0"/>
+              </a:ext>
+            </a:extLst>
+          </a:blip>
+          <a:stretch>
+            <a:fillRect/>
+          </a:stretch>
+        </p:blipFill>
+        <p:spPr>
+          <a:xfrm>
+            <a:off x="1670587" y="7172871"/>
+            <a:ext cx="4284771" cy="2856514"/>
+          </a:xfrm>
+          <a:prstGeom prst="rect">
+            <a:avLst/>
+          </a:prstGeom>
+        </p:spPr>
+      </p:pic>
+      <p:pic>
+        <p:nvPicPr>
+          <p:cNvPr id="9" name="Picture 8"/>
+          <p:cNvPicPr>
+            <a:picLocks noChangeAspect="1"/>
+          </p:cNvPicPr>
+          <p:nvPr/>
+        </p:nvPicPr>
+        <p:blipFill>
+          <a:blip r:embed="rId4">
+            <a:extLst>
+              <a:ext uri="{28A0092B-C50C-407E-A947-70E740481C1C}">
+                <a14:useLocalDpi xmlns:a14="http://schemas.microsoft.com/office/drawing/2010/main" val="0"/>
+              </a:ext>
+            </a:extLst>
+          </a:blip>
+          <a:stretch>
+            <a:fillRect/>
+          </a:stretch>
+        </p:blipFill>
+        <p:spPr>
+          <a:xfrm>
+            <a:off x="153277" y="3959908"/>
+            <a:ext cx="3437046" cy="2291364"/>
+          </a:xfrm>
+          <a:prstGeom prst="rect">
+            <a:avLst/>
+          </a:prstGeom>
+        </p:spPr>
+      </p:pic>
+      <p:pic>
+        <p:nvPicPr>
+          <p:cNvPr id="10" name="Picture 9"/>
+          <p:cNvPicPr>
+            <a:picLocks noChangeAspect="1"/>
+          </p:cNvPicPr>
+          <p:nvPr/>
+        </p:nvPicPr>
+        <p:blipFill>
+          <a:blip r:embed="rId5">
+            <a:extLst>
+              <a:ext uri="{28A0092B-C50C-407E-A947-70E740481C1C}">
+                <a14:useLocalDpi xmlns:a14="http://schemas.microsoft.com/office/drawing/2010/main" val="0"/>
+              </a:ext>
+            </a:extLst>
+          </a:blip>
+          <a:stretch>
+            <a:fillRect/>
+          </a:stretch>
+        </p:blipFill>
+        <p:spPr>
+          <a:xfrm>
+            <a:off x="3474720" y="3330943"/>
+            <a:ext cx="4653103" cy="3323645"/>
+          </a:xfrm>
+          <a:prstGeom prst="rect">
+            <a:avLst/>
+          </a:prstGeom>
+        </p:spPr>
+      </p:pic>
+      <p:sp>
+        <p:nvSpPr>
+          <p:cNvPr id="11" name="TextBox 10"/>
+          <p:cNvSpPr txBox="1"/>
+          <p:nvPr/>
+        </p:nvSpPr>
+        <p:spPr>
+          <a:xfrm rot="16200000">
+            <a:off x="3192610" y="4892737"/>
+            <a:ext cx="1040670" cy="200055"/>
+          </a:xfrm>
+          <a:prstGeom prst="rect">
+            <a:avLst/>
+          </a:prstGeom>
+          <a:noFill/>
+        </p:spPr>
+        <p:txBody>
+          <a:bodyPr wrap="none" rtlCol="0">
+            <a:spAutoFit/>
+          </a:bodyPr>
+          <a:lstStyle/>
+          <a:p>
+            <a:r>
+              <a:rPr lang="en-US" sz="700" dirty="0">
+                <a:latin typeface="Helvetica Neue" charset="0"/>
+                <a:ea typeface="Helvetica Neue" charset="0"/>
+                <a:cs typeface="Helvetica Neue" charset="0"/>
+              </a:rPr>
+              <a:t>Distance from Center</a:t>
+            </a:r>
+          </a:p>
+        </p:txBody>
+      </p:sp>
+      <p:sp>
+        <p:nvSpPr>
+          <p:cNvPr id="12" name="TextBox 11"/>
+          <p:cNvSpPr txBox="1"/>
+          <p:nvPr/>
+        </p:nvSpPr>
+        <p:spPr>
+          <a:xfrm>
+            <a:off x="563522" y="3584364"/>
+            <a:ext cx="2459328" cy="230832"/>
+          </a:xfrm>
+          <a:prstGeom prst="rect">
+            <a:avLst/>
+          </a:prstGeom>
+          <a:noFill/>
+        </p:spPr>
+        <p:txBody>
+          <a:bodyPr wrap="none" rtlCol="0">
+            <a:spAutoFit/>
+          </a:bodyPr>
+          <a:lstStyle/>
+          <a:p>
+            <a:r>
+              <a:rPr lang="en-US" sz="900" dirty="0" smtClean="0">
+                <a:latin typeface="Helvetica Neue" charset="0"/>
+                <a:ea typeface="Helvetica Neue" charset="0"/>
+                <a:cs typeface="Helvetica Neue" charset="0"/>
+              </a:rPr>
+              <a:t>Range in Center Distances vs Majority Party</a:t>
+            </a:r>
+            <a:endParaRPr lang="en-US" sz="900" dirty="0">
+              <a:latin typeface="Helvetica Neue" charset="0"/>
+              <a:ea typeface="Helvetica Neue" charset="0"/>
+              <a:cs typeface="Helvetica Neue" charset="0"/>
+            </a:endParaRPr>
+          </a:p>
+        </p:txBody>
+      </p:sp>
+      <p:sp>
+        <p:nvSpPr>
+          <p:cNvPr id="14" name="TextBox 13"/>
+          <p:cNvSpPr txBox="1"/>
+          <p:nvPr/>
+        </p:nvSpPr>
+        <p:spPr>
+          <a:xfrm>
+            <a:off x="5592814" y="3678888"/>
+            <a:ext cx="532518" cy="230832"/>
+          </a:xfrm>
+          <a:prstGeom prst="rect">
+            <a:avLst/>
+          </a:prstGeom>
+          <a:noFill/>
+        </p:spPr>
+        <p:txBody>
+          <a:bodyPr wrap="none" rtlCol="0">
+            <a:spAutoFit/>
+          </a:bodyPr>
+          <a:lstStyle/>
+          <a:p>
+            <a:r>
+              <a:rPr lang="en-US" sz="900" dirty="0" smtClean="0">
+                <a:latin typeface="Helvetica Neue" charset="0"/>
+                <a:ea typeface="Helvetica Neue" charset="0"/>
+                <a:cs typeface="Helvetica Neue" charset="0"/>
+              </a:rPr>
+              <a:t>Center</a:t>
+            </a:r>
+            <a:endParaRPr lang="en-US" sz="900" dirty="0">
+              <a:latin typeface="Helvetica Neue" charset="0"/>
+              <a:ea typeface="Helvetica Neue" charset="0"/>
+              <a:cs typeface="Helvetica Neue" charset="0"/>
+            </a:endParaRPr>
+          </a:p>
+        </p:txBody>
+      </p:sp>
+      <p:sp>
+        <p:nvSpPr>
+          <p:cNvPr id="15" name="Rectangle 14"/>
+          <p:cNvSpPr/>
+          <p:nvPr/>
+        </p:nvSpPr>
+        <p:spPr>
+          <a:xfrm>
+            <a:off x="3604390" y="3678888"/>
+            <a:ext cx="4139873" cy="2906679"/>
+          </a:xfrm>
+          <a:prstGeom prst="rect">
+            <a:avLst/>
+          </a:prstGeom>
+          <a:noFill/>
+          <a:ln w="3175">
+            <a:solidFill>
+              <a:schemeClr val="tx1"/>
+            </a:solidFill>
+          </a:ln>
+        </p:spPr>
+        <p:style>
+          <a:lnRef idx="2">
+            <a:schemeClr val="accent1">
+              <a:shade val="50000"/>
+            </a:schemeClr>
+          </a:lnRef>
+          <a:fillRef idx="1">
+            <a:schemeClr val="accent1"/>
+          </a:fillRef>
+          <a:effectRef idx="0">
+            <a:schemeClr val="accent1"/>
+          </a:effectRef>
+          <a:fontRef idx="minor">
+            <a:schemeClr val="lt1"/>
+          </a:fontRef>
+        </p:style>
+        <p:txBody>
+          <a:bodyPr rtlCol="0" anchor="ctr"/>
+          <a:lstStyle/>
+          <a:p>
+            <a:pPr algn="ctr"/>
+            <a:endParaRPr lang="en-US"/>
+          </a:p>
+        </p:txBody>
+      </p:sp>
+      <p:cxnSp>
+        <p:nvCxnSpPr>
+          <p:cNvPr id="17" name="Straight Connector 16"/>
+          <p:cNvCxnSpPr/>
+          <p:nvPr/>
+        </p:nvCxnSpPr>
+        <p:spPr>
+          <a:xfrm flipH="1">
+            <a:off x="3604390" y="3186023"/>
+            <a:ext cx="3060954" cy="492865"/>
+          </a:xfrm>
+          <a:prstGeom prst="line">
+            <a:avLst/>
+          </a:prstGeom>
+          <a:ln>
+            <a:solidFill>
+              <a:schemeClr val="tx1"/>
+            </a:solidFill>
+          </a:ln>
+        </p:spPr>
+        <p:style>
+          <a:lnRef idx="1">
+            <a:schemeClr val="accent1"/>
+          </a:lnRef>
+          <a:fillRef idx="0">
+            <a:schemeClr val="accent1"/>
+          </a:fillRef>
+          <a:effectRef idx="0">
+            <a:schemeClr val="accent1"/>
+          </a:effectRef>
+          <a:fontRef idx="minor">
+            <a:schemeClr val="tx1"/>
+          </a:fontRef>
+        </p:style>
+      </p:cxnSp>
+      <p:cxnSp>
+        <p:nvCxnSpPr>
+          <p:cNvPr id="21" name="Straight Connector 20"/>
+          <p:cNvCxnSpPr/>
+          <p:nvPr/>
+        </p:nvCxnSpPr>
+        <p:spPr>
+          <a:xfrm>
+            <a:off x="6665344" y="3186023"/>
+            <a:ext cx="1078919" cy="492865"/>
+          </a:xfrm>
+          <a:prstGeom prst="line">
+            <a:avLst/>
+          </a:prstGeom>
+          <a:ln>
+            <a:solidFill>
+              <a:schemeClr val="tx1"/>
+            </a:solidFill>
+          </a:ln>
+        </p:spPr>
+        <p:style>
+          <a:lnRef idx="1">
+            <a:schemeClr val="accent1"/>
+          </a:lnRef>
+          <a:fillRef idx="0">
+            <a:schemeClr val="accent1"/>
+          </a:fillRef>
+          <a:effectRef idx="0">
+            <a:schemeClr val="accent1"/>
+          </a:effectRef>
+          <a:fontRef idx="minor">
+            <a:schemeClr val="tx1"/>
+          </a:fontRef>
+        </p:style>
+      </p:cxnSp>
+      <p:sp>
+        <p:nvSpPr>
+          <p:cNvPr id="23" name="TextBox 22"/>
+          <p:cNvSpPr txBox="1"/>
+          <p:nvPr/>
+        </p:nvSpPr>
+        <p:spPr>
+          <a:xfrm>
+            <a:off x="20834" y="3374738"/>
+            <a:ext cx="279244" cy="276999"/>
+          </a:xfrm>
+          <a:prstGeom prst="rect">
+            <a:avLst/>
+          </a:prstGeom>
+          <a:noFill/>
+        </p:spPr>
+        <p:txBody>
+          <a:bodyPr wrap="none" rtlCol="0">
+            <a:spAutoFit/>
+          </a:bodyPr>
+          <a:lstStyle/>
+          <a:p>
+            <a:r>
+              <a:rPr lang="en-US" sz="1200" b="1" dirty="0">
+                <a:latin typeface="Helvetica Neue" charset="0"/>
+                <a:ea typeface="Helvetica Neue" charset="0"/>
+                <a:cs typeface="Helvetica Neue" charset="0"/>
+              </a:rPr>
+              <a:t>b</a:t>
+            </a:r>
+          </a:p>
+        </p:txBody>
+      </p:sp>
+      <p:sp>
+        <p:nvSpPr>
+          <p:cNvPr id="24" name="TextBox 23"/>
+          <p:cNvSpPr txBox="1"/>
+          <p:nvPr/>
+        </p:nvSpPr>
+        <p:spPr>
+          <a:xfrm>
+            <a:off x="27246" y="6725668"/>
+            <a:ext cx="279244" cy="276999"/>
+          </a:xfrm>
+          <a:prstGeom prst="rect">
+            <a:avLst/>
+          </a:prstGeom>
+          <a:noFill/>
+        </p:spPr>
+        <p:txBody>
+          <a:bodyPr wrap="none" rtlCol="0">
+            <a:spAutoFit/>
+          </a:bodyPr>
+          <a:lstStyle/>
+          <a:p>
+            <a:r>
+              <a:rPr lang="en-US" sz="1200" b="1" dirty="0">
+                <a:latin typeface="Helvetica Neue" charset="0"/>
+                <a:ea typeface="Helvetica Neue" charset="0"/>
+                <a:cs typeface="Helvetica Neue" charset="0"/>
+              </a:rPr>
+              <a:t>d</a:t>
+            </a:r>
+          </a:p>
+        </p:txBody>
+      </p:sp>
+      <p:sp>
+        <p:nvSpPr>
+          <p:cNvPr id="25" name="TextBox 24"/>
+          <p:cNvSpPr txBox="1"/>
+          <p:nvPr/>
+        </p:nvSpPr>
+        <p:spPr>
+          <a:xfrm>
+            <a:off x="3453907" y="3374738"/>
+            <a:ext cx="272832" cy="276999"/>
+          </a:xfrm>
+          <a:prstGeom prst="rect">
+            <a:avLst/>
+          </a:prstGeom>
+          <a:noFill/>
+        </p:spPr>
+        <p:txBody>
+          <a:bodyPr wrap="none" rtlCol="0">
+            <a:spAutoFit/>
+          </a:bodyPr>
+          <a:lstStyle/>
+          <a:p>
+            <a:r>
+              <a:rPr lang="en-US" sz="1200" b="1" dirty="0">
+                <a:latin typeface="Helvetica Neue" charset="0"/>
+                <a:ea typeface="Helvetica Neue" charset="0"/>
+                <a:cs typeface="Helvetica Neue" charset="0"/>
+              </a:rPr>
+              <a:t>c</a:t>
+            </a:r>
+          </a:p>
+        </p:txBody>
+      </p:sp>
+      <p:sp>
+        <p:nvSpPr>
+          <p:cNvPr id="26" name="TextBox 25"/>
+          <p:cNvSpPr txBox="1"/>
+          <p:nvPr/>
+        </p:nvSpPr>
+        <p:spPr>
+          <a:xfrm>
+            <a:off x="2253460" y="6917762"/>
+            <a:ext cx="3563796" cy="230832"/>
+          </a:xfrm>
+          <a:prstGeom prst="rect">
+            <a:avLst/>
+          </a:prstGeom>
+          <a:noFill/>
+        </p:spPr>
+        <p:txBody>
+          <a:bodyPr wrap="none" rtlCol="0">
+            <a:spAutoFit/>
+          </a:bodyPr>
+          <a:lstStyle/>
+          <a:p>
+            <a:r>
+              <a:rPr lang="en-US" sz="900" dirty="0" smtClean="0">
+                <a:latin typeface="Helvetica Neue" charset="0"/>
+                <a:ea typeface="Helvetica Neue" charset="0"/>
+                <a:cs typeface="Helvetica Neue" charset="0"/>
+              </a:rPr>
+              <a:t>Correlation of DW-NOMINATE Coordinates and Center Distances</a:t>
+            </a:r>
+            <a:endParaRPr lang="en-US" sz="900" dirty="0">
+              <a:latin typeface="Helvetica Neue" charset="0"/>
+              <a:ea typeface="Helvetica Neue" charset="0"/>
+              <a:cs typeface="Helvetica Neue" charset="0"/>
+            </a:endParaRPr>
+          </a:p>
+        </p:txBody>
+      </p:sp>
+      <p:sp>
+        <p:nvSpPr>
+          <p:cNvPr id="27" name="Right Bracket 26"/>
+          <p:cNvSpPr/>
+          <p:nvPr/>
+        </p:nvSpPr>
+        <p:spPr>
+          <a:xfrm rot="16200000">
+            <a:off x="1733696" y="3804233"/>
+            <a:ext cx="124713" cy="1095508"/>
+          </a:xfrm>
+          <a:prstGeom prst="rightBracket">
+            <a:avLst/>
+          </a:prstGeom>
+          <a:ln>
+            <a:solidFill>
+              <a:schemeClr val="tx1"/>
+            </a:solidFill>
+          </a:ln>
+        </p:spPr>
+        <p:style>
+          <a:lnRef idx="1">
+            <a:schemeClr val="accent1"/>
+          </a:lnRef>
+          <a:fillRef idx="0">
+            <a:schemeClr val="accent1"/>
+          </a:fillRef>
+          <a:effectRef idx="0">
+            <a:schemeClr val="accent1"/>
+          </a:effectRef>
+          <a:fontRef idx="minor">
+            <a:schemeClr val="tx1"/>
+          </a:fontRef>
+        </p:style>
+        <p:txBody>
+          <a:bodyPr rtlCol="0" anchor="ctr"/>
+          <a:lstStyle/>
+          <a:p>
+            <a:pPr algn="ctr"/>
+            <a:endParaRPr lang="en-US"/>
+          </a:p>
+        </p:txBody>
+      </p:sp>
+      <p:sp>
+        <p:nvSpPr>
+          <p:cNvPr id="28" name="Right Bracket 27"/>
+          <p:cNvSpPr/>
+          <p:nvPr/>
+        </p:nvSpPr>
+        <p:spPr>
+          <a:xfrm rot="16200000">
+            <a:off x="1460100" y="3433648"/>
+            <a:ext cx="98667" cy="1105980"/>
+          </a:xfrm>
+          <a:prstGeom prst="rightBracket">
+            <a:avLst/>
+          </a:prstGeom>
+          <a:ln>
+            <a:solidFill>
+              <a:schemeClr val="tx1"/>
+            </a:solidFill>
+          </a:ln>
+        </p:spPr>
+        <p:style>
+          <a:lnRef idx="1">
+            <a:schemeClr val="accent1"/>
+          </a:lnRef>
+          <a:fillRef idx="0">
+            <a:schemeClr val="accent1"/>
+          </a:fillRef>
+          <a:effectRef idx="0">
+            <a:schemeClr val="accent1"/>
+          </a:effectRef>
+          <a:fontRef idx="minor">
+            <a:schemeClr val="tx1"/>
+          </a:fontRef>
+        </p:style>
+        <p:txBody>
+          <a:bodyPr rtlCol="0" anchor="ctr"/>
+          <a:lstStyle/>
+          <a:p>
+            <a:pPr algn="ctr"/>
+            <a:endParaRPr lang="en-US"/>
+          </a:p>
+        </p:txBody>
+      </p:sp>
+      <p:sp>
+        <p:nvSpPr>
+          <p:cNvPr id="29" name="TextBox 28"/>
+          <p:cNvSpPr txBox="1"/>
+          <p:nvPr/>
+        </p:nvSpPr>
+        <p:spPr>
+          <a:xfrm>
+            <a:off x="1670587" y="4123367"/>
+            <a:ext cx="250390" cy="276999"/>
+          </a:xfrm>
+          <a:prstGeom prst="rect">
+            <a:avLst/>
+          </a:prstGeom>
+          <a:noFill/>
+        </p:spPr>
+        <p:txBody>
+          <a:bodyPr wrap="none" rtlCol="0">
+            <a:spAutoFit/>
+          </a:bodyPr>
+          <a:lstStyle/>
+          <a:p>
+            <a:r>
+              <a:rPr lang="en-US" sz="1200" dirty="0" smtClean="0">
+                <a:latin typeface="Cambria Math" charset="0"/>
+                <a:ea typeface="Cambria Math" charset="0"/>
+                <a:cs typeface="Cambria Math" charset="0"/>
+              </a:rPr>
+              <a:t>*</a:t>
+            </a:r>
+            <a:endParaRPr lang="en-US" sz="1200" dirty="0">
+              <a:latin typeface="Cambria Math" charset="0"/>
+              <a:ea typeface="Cambria Math" charset="0"/>
+              <a:cs typeface="Cambria Math" charset="0"/>
+            </a:endParaRPr>
+          </a:p>
+        </p:txBody>
+      </p:sp>
+      <p:sp>
+        <p:nvSpPr>
+          <p:cNvPr id="30" name="TextBox 29"/>
+          <p:cNvSpPr txBox="1"/>
+          <p:nvPr/>
+        </p:nvSpPr>
+        <p:spPr>
+          <a:xfrm>
+            <a:off x="1384238" y="3762422"/>
+            <a:ext cx="250390" cy="276999"/>
+          </a:xfrm>
+          <a:prstGeom prst="rect">
+            <a:avLst/>
+          </a:prstGeom>
+          <a:noFill/>
+        </p:spPr>
+        <p:txBody>
+          <a:bodyPr wrap="none" rtlCol="0">
+            <a:spAutoFit/>
+          </a:bodyPr>
+          <a:lstStyle/>
+          <a:p>
+            <a:r>
+              <a:rPr lang="en-US" sz="1200" dirty="0" smtClean="0">
+                <a:latin typeface="Cambria Math" charset="0"/>
+                <a:ea typeface="Cambria Math" charset="0"/>
+                <a:cs typeface="Cambria Math" charset="0"/>
+              </a:rPr>
+              <a:t>*</a:t>
+            </a:r>
+            <a:endParaRPr lang="en-US" sz="1200" dirty="0">
+              <a:latin typeface="Cambria Math" charset="0"/>
+              <a:ea typeface="Cambria Math" charset="0"/>
+              <a:cs typeface="Cambria Math" charset="0"/>
+            </a:endParaRPr>
+          </a:p>
+        </p:txBody>
+      </p:sp>
+    </p:spTree>
+    <p:extLst>
+      <p:ext uri="{BB962C8B-B14F-4D97-AF65-F5344CB8AC3E}">
+        <p14:creationId xmlns:p14="http://schemas.microsoft.com/office/powerpoint/2010/main" val="1886731308"/>
+      </p:ext>
+    </p:extLst>
+  </p:cSld>
+  <p:clrMapOvr>
+    <a:masterClrMapping/>
+  </p:clrMapOvr>
+</p:sld>
+</file>
+
+<file path=ppt/slides/slide9.xml><?xml version="1.0" encoding="utf-8"?>
 <p:sld xmlns:a="http://schemas.openxmlformats.org/drawingml/2006/main" xmlns:r="http://schemas.openxmlformats.org/officeDocument/2006/relationships" xmlns:p="http://schemas.openxmlformats.org/presentationml/2006/main">
   <p:cSld>
     <p:spTree>

</xml_diff>